<commit_message>
Updated Dataset slide and added comparison slide
</commit_message>
<xml_diff>
--- a/Documentation/SVM Folien.pptx
+++ b/Documentation/SVM Folien.pptx
@@ -5,10 +5,10 @@
     <p:sldMasterId id="2147483648" r:id="rId1"/>
   </p:sldMasterIdLst>
   <p:notesMasterIdLst>
-    <p:notesMasterId r:id="rId8"/>
+    <p:notesMasterId r:id="rId9"/>
   </p:notesMasterIdLst>
   <p:handoutMasterIdLst>
-    <p:handoutMasterId r:id="rId9"/>
+    <p:handoutMasterId r:id="rId10"/>
   </p:handoutMasterIdLst>
   <p:sldIdLst>
     <p:sldId id="302" r:id="rId2"/>
@@ -16,7 +16,8 @@
     <p:sldId id="298" r:id="rId4"/>
     <p:sldId id="301" r:id="rId5"/>
     <p:sldId id="303" r:id="rId6"/>
-    <p:sldId id="287" r:id="rId7"/>
+    <p:sldId id="305" r:id="rId7"/>
+    <p:sldId id="287" r:id="rId8"/>
   </p:sldIdLst>
   <p:sldSz cx="9144000" cy="5143500" type="screen16x9"/>
   <p:notesSz cx="6858000" cy="9144000"/>
@@ -231,7 +232,7 @@
           <a:p>
             <a:fld id="{2DEC1590-0E15-4557-9C65-D8AD6B18B0C9}" type="datetimeFigureOut">
               <a:rPr lang="de-DE" smtClean="0"/>
-              <a:t>09.07.20</a:t>
+              <a:t>11.07.20</a:t>
             </a:fld>
             <a:endParaRPr lang="de-DE"/>
           </a:p>
@@ -408,7 +409,7 @@
           <a:p>
             <a:fld id="{04B5924E-4B7F-4B37-BD36-3DA72D6B2A43}" type="datetimeFigureOut">
               <a:rPr lang="de-DE" smtClean="0"/>
-              <a:t>09.07.20</a:t>
+              <a:t>11.07.20</a:t>
             </a:fld>
             <a:endParaRPr lang="de-DE"/>
           </a:p>
@@ -958,7 +959,7 @@
           <a:p>
             <a:fld id="{09D069C5-CC22-4E88-BB35-FA27CD7EA121}" type="datetime1">
               <a:rPr lang="de-DE" smtClean="0"/>
-              <a:t>09.07.20</a:t>
+              <a:t>11.07.20</a:t>
             </a:fld>
             <a:endParaRPr lang="de-DE" dirty="0"/>
           </a:p>
@@ -1336,7 +1337,7 @@
           <a:p>
             <a:fld id="{09D069C5-CC22-4E88-BB35-FA27CD7EA121}" type="datetime1">
               <a:rPr lang="de-DE" smtClean="0"/>
-              <a:t>09.07.20</a:t>
+              <a:t>11.07.20</a:t>
             </a:fld>
             <a:endParaRPr lang="de-DE" dirty="0"/>
           </a:p>
@@ -1692,7 +1693,7 @@
           <a:p>
             <a:fld id="{09D069C5-CC22-4E88-BB35-FA27CD7EA121}" type="datetime1">
               <a:rPr lang="de-DE" smtClean="0"/>
-              <a:t>09.07.20</a:t>
+              <a:t>11.07.20</a:t>
             </a:fld>
             <a:endParaRPr lang="de-DE" dirty="0"/>
           </a:p>
@@ -2047,7 +2048,7 @@
           <a:p>
             <a:fld id="{09D069C5-CC22-4E88-BB35-FA27CD7EA121}" type="datetime1">
               <a:rPr lang="de-DE" smtClean="0"/>
-              <a:t>09.07.20</a:t>
+              <a:t>11.07.20</a:t>
             </a:fld>
             <a:endParaRPr lang="de-DE" dirty="0"/>
           </a:p>
@@ -2311,7 +2312,7 @@
           <a:p>
             <a:fld id="{09D069C5-CC22-4E88-BB35-FA27CD7EA121}" type="datetime1">
               <a:rPr lang="de-DE" smtClean="0"/>
-              <a:t>09.07.20</a:t>
+              <a:t>11.07.20</a:t>
             </a:fld>
             <a:endParaRPr lang="de-DE" dirty="0"/>
           </a:p>
@@ -2518,7 +2519,7 @@
           <a:p>
             <a:fld id="{09D069C5-CC22-4E88-BB35-FA27CD7EA121}" type="datetime1">
               <a:rPr lang="de-DE" smtClean="0"/>
-              <a:t>09.07.20</a:t>
+              <a:t>11.07.20</a:t>
             </a:fld>
             <a:endParaRPr lang="de-DE" dirty="0"/>
           </a:p>
@@ -2798,7 +2799,7 @@
           <a:p>
             <a:fld id="{09D069C5-CC22-4E88-BB35-FA27CD7EA121}" type="datetime1">
               <a:rPr lang="de-DE" smtClean="0"/>
-              <a:t>09.07.20</a:t>
+              <a:t>11.07.20</a:t>
             </a:fld>
             <a:endParaRPr lang="de-DE" dirty="0"/>
           </a:p>
@@ -4077,6 +4078,53 @@
               <a:rPr lang="de-DE" dirty="0" err="1"/>
               <a:t>labels</a:t>
             </a:r>
+            <a:endParaRPr lang="de-DE" dirty="0"/>
+          </a:p>
+          <a:p>
+            <a:pPr marL="342900" indent="-342900">
+              <a:buFont typeface="Arial" panose="020B0604020202020204" pitchFamily="34" charset="0"/>
+              <a:buChar char="•"/>
+            </a:pPr>
+            <a:r>
+              <a:rPr lang="de-DE" dirty="0">
+                <a:solidFill>
+                  <a:srgbClr val="FF0000"/>
+                </a:solidFill>
+              </a:rPr>
+              <a:t>Problems </a:t>
+            </a:r>
+            <a:r>
+              <a:rPr lang="de-DE" dirty="0" err="1">
+                <a:solidFill>
+                  <a:srgbClr val="FF0000"/>
+                </a:solidFill>
+              </a:rPr>
+              <a:t>with</a:t>
+            </a:r>
+            <a:r>
+              <a:rPr lang="de-DE" dirty="0">
+                <a:solidFill>
+                  <a:srgbClr val="FF0000"/>
+                </a:solidFill>
+              </a:rPr>
+              <a:t> </a:t>
+            </a:r>
+            <a:r>
+              <a:rPr lang="de-DE" dirty="0" err="1">
+                <a:solidFill>
+                  <a:srgbClr val="FF0000"/>
+                </a:solidFill>
+              </a:rPr>
+              <a:t>the</a:t>
+            </a:r>
+            <a:r>
+              <a:rPr lang="de-DE" dirty="0">
+                <a:solidFill>
+                  <a:srgbClr val="FF0000"/>
+                </a:solidFill>
+              </a:rPr>
+              <a:t> Dataset</a:t>
+            </a:r>
             <a:br>
               <a:rPr lang="de-DE" dirty="0"/>
             </a:br>
@@ -4110,7 +4158,7 @@
           <a:p>
             <a:fld id="{09D069C5-CC22-4E88-BB35-FA27CD7EA121}" type="datetime1">
               <a:rPr lang="de-DE" smtClean="0"/>
-              <a:t>09.07.20</a:t>
+              <a:t>11.07.20</a:t>
             </a:fld>
             <a:endParaRPr lang="de-DE" dirty="0"/>
           </a:p>
@@ -4138,8 +4186,28 @@
           <a:lstStyle/>
           <a:p>
             <a:r>
-              <a:rPr lang="de-DE"/>
-              <a:t>Group 5 - Facial emotion recognition</a:t>
+              <a:rPr lang="de-DE" dirty="0"/>
+              <a:t>Group 5 - </a:t>
+            </a:r>
+            <a:r>
+              <a:rPr lang="de-DE" dirty="0" err="1"/>
+              <a:t>Facial</a:t>
+            </a:r>
+            <a:r>
+              <a:rPr lang="de-DE" dirty="0"/>
+              <a:t> </a:t>
+            </a:r>
+            <a:r>
+              <a:rPr lang="de-DE" dirty="0" err="1"/>
+              <a:t>emotion</a:t>
+            </a:r>
+            <a:r>
+              <a:rPr lang="de-DE" dirty="0"/>
+              <a:t> </a:t>
+            </a:r>
+            <a:r>
+              <a:rPr lang="de-DE" dirty="0" err="1"/>
+              <a:t>recognition</a:t>
             </a:r>
             <a:endParaRPr lang="de-DE" dirty="0"/>
           </a:p>
@@ -4174,36 +4242,6 @@
           </a:p>
         </p:txBody>
       </p:sp>
-      <p:pic>
-        <p:nvPicPr>
-          <p:cNvPr id="8" name="Grafik 7" descr="Ein Bild, das Screenshot enthält.&#10;&#10;Automatisch generierte Beschreibung">
-            <a:extLst>
-              <a:ext uri="{FF2B5EF4-FFF2-40B4-BE49-F238E27FC236}">
-                <a16:creationId xmlns:a16="http://schemas.microsoft.com/office/drawing/2014/main" id="{A530D8FE-CA3C-BA4C-A4D4-3C72CE1CEC7B}"/>
-              </a:ext>
-            </a:extLst>
-          </p:cNvPr>
-          <p:cNvPicPr>
-            <a:picLocks noChangeAspect="1"/>
-          </p:cNvPicPr>
-          <p:nvPr/>
-        </p:nvPicPr>
-        <p:blipFill>
-          <a:blip r:embed="rId2"/>
-          <a:stretch>
-            <a:fillRect/>
-          </a:stretch>
-        </p:blipFill>
-        <p:spPr>
-          <a:xfrm>
-            <a:off x="3767038" y="3082502"/>
-            <a:ext cx="5341466" cy="1577480"/>
-          </a:xfrm>
-          <a:prstGeom prst="rect">
-            <a:avLst/>
-          </a:prstGeom>
-        </p:spPr>
-      </p:pic>
       <p:pic>
         <p:nvPicPr>
           <p:cNvPr id="7" name="Grafik 6">
@@ -4219,7 +4257,7 @@
           <p:nvPr/>
         </p:nvPicPr>
         <p:blipFill>
-          <a:blip r:embed="rId3"/>
+          <a:blip r:embed="rId2"/>
           <a:stretch>
             <a:fillRect/>
           </a:stretch>
@@ -4249,7 +4287,7 @@
           <p:nvPr/>
         </p:nvPicPr>
         <p:blipFill>
-          <a:blip r:embed="rId4"/>
+          <a:blip r:embed="rId3"/>
           <a:stretch>
             <a:fillRect/>
           </a:stretch>
@@ -4264,6 +4302,207 @@
           </a:prstGeom>
         </p:spPr>
       </p:pic>
+      <p:pic>
+        <p:nvPicPr>
+          <p:cNvPr id="10" name="Bildschirmfoto 2020-07-10 um 01.39.01.png" descr="Bildschirmfoto 2020-07-10 um 01.39.01.png">
+            <a:extLst>
+              <a:ext uri="{FF2B5EF4-FFF2-40B4-BE49-F238E27FC236}">
+                <a16:creationId xmlns:a16="http://schemas.microsoft.com/office/drawing/2014/main" id="{C0A49B24-533F-944D-A73B-5F1E263FE564}"/>
+              </a:ext>
+            </a:extLst>
+          </p:cNvPr>
+          <p:cNvPicPr>
+            <a:picLocks noChangeAspect="1"/>
+          </p:cNvPicPr>
+          <p:nvPr/>
+        </p:nvPicPr>
+        <p:blipFill>
+          <a:blip r:embed="rId4"/>
+          <a:srcRect l="1583" t="35766" r="536"/>
+          <a:stretch>
+            <a:fillRect/>
+          </a:stretch>
+        </p:blipFill>
+        <p:spPr>
+          <a:xfrm>
+            <a:off x="5020786" y="3649880"/>
+            <a:ext cx="1587500" cy="652052"/>
+          </a:xfrm>
+          <a:prstGeom prst="rect">
+            <a:avLst/>
+          </a:prstGeom>
+          <a:ln w="12700">
+            <a:miter lim="400000"/>
+          </a:ln>
+        </p:spPr>
+      </p:pic>
+      <p:pic>
+        <p:nvPicPr>
+          <p:cNvPr id="11" name="Bildschirmfoto 2020-07-10 um 01.39.23.png" descr="Bildschirmfoto 2020-07-10 um 01.39.23.png">
+            <a:extLst>
+              <a:ext uri="{FF2B5EF4-FFF2-40B4-BE49-F238E27FC236}">
+                <a16:creationId xmlns:a16="http://schemas.microsoft.com/office/drawing/2014/main" id="{2658AFA9-FB99-8549-BC2E-14CBDB5AEB13}"/>
+              </a:ext>
+            </a:extLst>
+          </p:cNvPr>
+          <p:cNvPicPr>
+            <a:picLocks noChangeAspect="1"/>
+          </p:cNvPicPr>
+          <p:nvPr/>
+        </p:nvPicPr>
+        <p:blipFill>
+          <a:blip r:embed="rId5"/>
+          <a:srcRect t="34103"/>
+          <a:stretch>
+            <a:fillRect/>
+          </a:stretch>
+        </p:blipFill>
+        <p:spPr>
+          <a:xfrm>
+            <a:off x="7232972" y="3648118"/>
+            <a:ext cx="1587500" cy="653813"/>
+          </a:xfrm>
+          <a:prstGeom prst="rect">
+            <a:avLst/>
+          </a:prstGeom>
+          <a:ln w="12700">
+            <a:miter lim="400000"/>
+          </a:ln>
+        </p:spPr>
+      </p:pic>
+      <p:sp>
+        <p:nvSpPr>
+          <p:cNvPr id="12" name="Textfeld 11">
+            <a:extLst>
+              <a:ext uri="{FF2B5EF4-FFF2-40B4-BE49-F238E27FC236}">
+                <a16:creationId xmlns:a16="http://schemas.microsoft.com/office/drawing/2014/main" id="{5B81880A-B38A-EB49-86F4-EC630CD23AEB}"/>
+              </a:ext>
+            </a:extLst>
+          </p:cNvPr>
+          <p:cNvSpPr txBox="1"/>
+          <p:nvPr/>
+        </p:nvSpPr>
+        <p:spPr>
+          <a:xfrm>
+            <a:off x="6689902" y="3762348"/>
+            <a:ext cx="457176" cy="369332"/>
+          </a:xfrm>
+          <a:prstGeom prst="rect">
+            <a:avLst/>
+          </a:prstGeom>
+          <a:noFill/>
+        </p:spPr>
+        <p:txBody>
+          <a:bodyPr wrap="none" rtlCol="0">
+            <a:spAutoFit/>
+          </a:bodyPr>
+          <a:lstStyle/>
+          <a:p>
+            <a:r>
+              <a:rPr lang="de-DE" dirty="0">
+                <a:solidFill>
+                  <a:srgbClr val="FF0000"/>
+                </a:solidFill>
+              </a:rPr>
+              <a:t>⟺</a:t>
+            </a:r>
+          </a:p>
+        </p:txBody>
+      </p:sp>
+      <p:sp>
+        <p:nvSpPr>
+          <p:cNvPr id="13" name="Textfeld 12">
+            <a:extLst>
+              <a:ext uri="{FF2B5EF4-FFF2-40B4-BE49-F238E27FC236}">
+                <a16:creationId xmlns:a16="http://schemas.microsoft.com/office/drawing/2014/main" id="{4B7218FA-C99B-4A44-AE63-C2588A206DC9}"/>
+              </a:ext>
+            </a:extLst>
+          </p:cNvPr>
+          <p:cNvSpPr txBox="1"/>
+          <p:nvPr/>
+        </p:nvSpPr>
+        <p:spPr>
+          <a:xfrm>
+            <a:off x="5011831" y="4280197"/>
+            <a:ext cx="1521122" cy="307777"/>
+          </a:xfrm>
+          <a:prstGeom prst="rect">
+            <a:avLst/>
+          </a:prstGeom>
+          <a:noFill/>
+        </p:spPr>
+        <p:txBody>
+          <a:bodyPr wrap="none" rtlCol="0">
+            <a:spAutoFit/>
+          </a:bodyPr>
+          <a:lstStyle/>
+          <a:p>
+            <a:r>
+              <a:rPr lang="de-DE" sz="1400" dirty="0" err="1"/>
+              <a:t>Labeled</a:t>
+            </a:r>
+            <a:r>
+              <a:rPr lang="de-DE" sz="1400" dirty="0"/>
+              <a:t> </a:t>
+            </a:r>
+            <a:r>
+              <a:rPr lang="de-DE" sz="1400" dirty="0" err="1"/>
+              <a:t>as</a:t>
+            </a:r>
+            <a:r>
+              <a:rPr lang="de-DE" sz="1400" dirty="0"/>
+              <a:t> neutral</a:t>
+            </a:r>
+          </a:p>
+        </p:txBody>
+      </p:sp>
+      <p:sp>
+        <p:nvSpPr>
+          <p:cNvPr id="14" name="Textfeld 13">
+            <a:extLst>
+              <a:ext uri="{FF2B5EF4-FFF2-40B4-BE49-F238E27FC236}">
+                <a16:creationId xmlns:a16="http://schemas.microsoft.com/office/drawing/2014/main" id="{9327F9BB-FA28-EB4A-B571-0B620339AA31}"/>
+              </a:ext>
+            </a:extLst>
+          </p:cNvPr>
+          <p:cNvSpPr txBox="1"/>
+          <p:nvPr/>
+        </p:nvSpPr>
+        <p:spPr>
+          <a:xfrm>
+            <a:off x="7247861" y="4280197"/>
+            <a:ext cx="1445332" cy="307777"/>
+          </a:xfrm>
+          <a:prstGeom prst="rect">
+            <a:avLst/>
+          </a:prstGeom>
+          <a:noFill/>
+        </p:spPr>
+        <p:txBody>
+          <a:bodyPr wrap="none" rtlCol="0">
+            <a:spAutoFit/>
+          </a:bodyPr>
+          <a:lstStyle/>
+          <a:p>
+            <a:r>
+              <a:rPr lang="de-DE" sz="1400" dirty="0" err="1"/>
+              <a:t>Labeled</a:t>
+            </a:r>
+            <a:r>
+              <a:rPr lang="de-DE" sz="1400" dirty="0"/>
+              <a:t> </a:t>
+            </a:r>
+            <a:r>
+              <a:rPr lang="de-DE" sz="1400" dirty="0" err="1"/>
+              <a:t>as</a:t>
+            </a:r>
+            <a:r>
+              <a:rPr lang="de-DE" sz="1400" dirty="0"/>
+              <a:t> happy</a:t>
+            </a:r>
+          </a:p>
+        </p:txBody>
+      </p:sp>
     </p:spTree>
     <p:extLst>
       <p:ext uri="{BB962C8B-B14F-4D97-AF65-F5344CB8AC3E}">
@@ -4323,8 +4562,8 @@
           </a:p>
         </p:txBody>
       </p:sp>
-      <mc:AlternateContent xmlns:mc="http://schemas.openxmlformats.org/markup-compatibility/2006">
-        <mc:Choice xmlns:a14="http://schemas.microsoft.com/office/drawing/2010/main" Requires="a14">
+      <mc:AlternateContent xmlns:mc="http://schemas.openxmlformats.org/markup-compatibility/2006" xmlns:a14="http://schemas.microsoft.com/office/drawing/2010/main">
+        <mc:Choice Requires="a14">
           <p:sp>
             <p:nvSpPr>
               <p:cNvPr id="3" name="Textplatzhalter 2">
@@ -4554,7 +4793,7 @@
             </p:txBody>
           </p:sp>
         </mc:Choice>
-        <mc:Fallback>
+        <mc:Fallback xmlns="">
           <p:sp>
             <p:nvSpPr>
               <p:cNvPr id="3" name="Textplatzhalter 2">
@@ -4617,7 +4856,7 @@
           <a:p>
             <a:fld id="{09D069C5-CC22-4E88-BB35-FA27CD7EA121}" type="datetime1">
               <a:rPr lang="de-DE" smtClean="0"/>
-              <a:t>09.07.20</a:t>
+              <a:t>11.07.20</a:t>
             </a:fld>
             <a:endParaRPr lang="de-DE" dirty="0"/>
           </a:p>
@@ -4835,8 +5074,8 @@
           </a:p>
         </p:txBody>
       </p:sp>
-      <mc:AlternateContent xmlns:mc="http://schemas.openxmlformats.org/markup-compatibility/2006">
-        <mc:Choice xmlns:a14="http://schemas.microsoft.com/office/drawing/2010/main" Requires="a14">
+      <mc:AlternateContent xmlns:mc="http://schemas.openxmlformats.org/markup-compatibility/2006" xmlns:a14="http://schemas.microsoft.com/office/drawing/2010/main">
+        <mc:Choice Requires="a14">
           <p:sp>
             <p:nvSpPr>
               <p:cNvPr id="3" name="Textplatzhalter 2">
@@ -5512,7 +5751,7 @@
             </p:txBody>
           </p:sp>
         </mc:Choice>
-        <mc:Fallback>
+        <mc:Fallback xmlns="">
           <p:sp>
             <p:nvSpPr>
               <p:cNvPr id="3" name="Textplatzhalter 2">
@@ -5575,7 +5814,7 @@
           <a:p>
             <a:fld id="{09D069C5-CC22-4E88-BB35-FA27CD7EA121}" type="datetime1">
               <a:rPr lang="de-DE" smtClean="0"/>
-              <a:t>09.07.20</a:t>
+              <a:t>11.07.20</a:t>
             </a:fld>
             <a:endParaRPr lang="de-DE" dirty="0"/>
           </a:p>
@@ -5826,8 +6065,8 @@
           </a:p>
         </p:txBody>
       </p:sp>
-      <mc:AlternateContent xmlns:mc="http://schemas.openxmlformats.org/markup-compatibility/2006">
-        <mc:Choice xmlns:a14="http://schemas.microsoft.com/office/drawing/2010/main" Requires="a14">
+      <mc:AlternateContent xmlns:mc="http://schemas.openxmlformats.org/markup-compatibility/2006" xmlns:a14="http://schemas.microsoft.com/office/drawing/2010/main">
+        <mc:Choice Requires="a14">
           <p:sp>
             <p:nvSpPr>
               <p:cNvPr id="3" name="Textplatzhalter 2">
@@ -6097,7 +6336,7 @@
             </p:txBody>
           </p:sp>
         </mc:Choice>
-        <mc:Fallback>
+        <mc:Fallback xmlns="">
           <p:sp>
             <p:nvSpPr>
               <p:cNvPr id="3" name="Textplatzhalter 2">
@@ -6160,7 +6399,7 @@
           <a:p>
             <a:fld id="{09D069C5-CC22-4E88-BB35-FA27CD7EA121}" type="datetime1">
               <a:rPr lang="de-DE" smtClean="0"/>
-              <a:t>09.07.20</a:t>
+              <a:t>11.07.20</a:t>
             </a:fld>
             <a:endParaRPr lang="de-DE" dirty="0"/>
           </a:p>
@@ -6514,7 +6753,7 @@
           <a:p>
             <a:fld id="{09D069C5-CC22-4E88-BB35-FA27CD7EA121}" type="datetime1">
               <a:rPr lang="de-DE" smtClean="0"/>
-              <a:t>10.07.20</a:t>
+              <a:t>11.07.20</a:t>
             </a:fld>
             <a:endParaRPr lang="de-DE" dirty="0"/>
           </a:p>
@@ -6622,6 +6861,534 @@
 </file>
 
 <file path=ppt/slides/slide6.xml><?xml version="1.0" encoding="utf-8"?>
+<p:sld xmlns:a="http://schemas.openxmlformats.org/drawingml/2006/main" xmlns:r="http://schemas.openxmlformats.org/officeDocument/2006/relationships" xmlns:p="http://schemas.openxmlformats.org/presentationml/2006/main">
+  <p:cSld>
+    <p:spTree>
+      <p:nvGrpSpPr>
+        <p:cNvPr id="1" name=""/>
+        <p:cNvGrpSpPr/>
+        <p:nvPr/>
+      </p:nvGrpSpPr>
+      <p:grpSpPr>
+        <a:xfrm>
+          <a:off x="0" y="0"/>
+          <a:ext cx="0" cy="0"/>
+          <a:chOff x="0" y="0"/>
+          <a:chExt cx="0" cy="0"/>
+        </a:xfrm>
+      </p:grpSpPr>
+      <p:sp>
+        <p:nvSpPr>
+          <p:cNvPr id="2" name="Textplatzhalter 1">
+            <a:extLst>
+              <a:ext uri="{FF2B5EF4-FFF2-40B4-BE49-F238E27FC236}">
+                <a16:creationId xmlns:a16="http://schemas.microsoft.com/office/drawing/2014/main" id="{9E07597C-1F55-1B43-9997-B0104B0706BB}"/>
+              </a:ext>
+            </a:extLst>
+          </p:cNvPr>
+          <p:cNvSpPr>
+            <a:spLocks noGrp="1"/>
+          </p:cNvSpPr>
+          <p:nvPr>
+            <p:ph type="body" sz="quarter" idx="13"/>
+          </p:nvPr>
+        </p:nvSpPr>
+        <p:spPr/>
+        <p:txBody>
+          <a:bodyPr/>
+          <a:lstStyle/>
+          <a:p>
+            <a:r>
+              <a:rPr lang="de-DE" dirty="0" err="1"/>
+              <a:t>Comparison</a:t>
+            </a:r>
+            <a:endParaRPr lang="de-DE" dirty="0"/>
+          </a:p>
+        </p:txBody>
+      </p:sp>
+      <p:sp>
+        <p:nvSpPr>
+          <p:cNvPr id="4" name="Datumsplatzhalter 3">
+            <a:extLst>
+              <a:ext uri="{FF2B5EF4-FFF2-40B4-BE49-F238E27FC236}">
+                <a16:creationId xmlns:a16="http://schemas.microsoft.com/office/drawing/2014/main" id="{A075A7F3-59C0-6E4A-9818-402DD6EA110C}"/>
+              </a:ext>
+            </a:extLst>
+          </p:cNvPr>
+          <p:cNvSpPr>
+            <a:spLocks noGrp="1"/>
+          </p:cNvSpPr>
+          <p:nvPr>
+            <p:ph type="dt" sz="half" idx="2"/>
+          </p:nvPr>
+        </p:nvSpPr>
+        <p:spPr/>
+        <p:txBody>
+          <a:bodyPr/>
+          <a:lstStyle/>
+          <a:p>
+            <a:fld id="{09D069C5-CC22-4E88-BB35-FA27CD7EA121}" type="datetime1">
+              <a:rPr lang="de-DE" smtClean="0"/>
+              <a:t>11.07.20</a:t>
+            </a:fld>
+            <a:endParaRPr lang="de-DE" dirty="0"/>
+          </a:p>
+        </p:txBody>
+      </p:sp>
+      <p:sp>
+        <p:nvSpPr>
+          <p:cNvPr id="5" name="Fußzeilenplatzhalter 4">
+            <a:extLst>
+              <a:ext uri="{FF2B5EF4-FFF2-40B4-BE49-F238E27FC236}">
+                <a16:creationId xmlns:a16="http://schemas.microsoft.com/office/drawing/2014/main" id="{299ADBD8-D8C7-9847-89CC-C8484DAA4904}"/>
+              </a:ext>
+            </a:extLst>
+          </p:cNvPr>
+          <p:cNvSpPr>
+            <a:spLocks noGrp="1"/>
+          </p:cNvSpPr>
+          <p:nvPr>
+            <p:ph type="ftr" sz="quarter" idx="3"/>
+          </p:nvPr>
+        </p:nvSpPr>
+        <p:spPr/>
+        <p:txBody>
+          <a:bodyPr/>
+          <a:lstStyle/>
+          <a:p>
+            <a:r>
+              <a:rPr lang="de-DE"/>
+              <a:t>Group 5 - Facial emotion recognition</a:t>
+            </a:r>
+            <a:endParaRPr lang="de-DE" dirty="0"/>
+          </a:p>
+        </p:txBody>
+      </p:sp>
+      <p:sp>
+        <p:nvSpPr>
+          <p:cNvPr id="6" name="Foliennummernplatzhalter 5">
+            <a:extLst>
+              <a:ext uri="{FF2B5EF4-FFF2-40B4-BE49-F238E27FC236}">
+                <a16:creationId xmlns:a16="http://schemas.microsoft.com/office/drawing/2014/main" id="{F62FA889-4B6E-7D42-AFDD-01EF91284EEB}"/>
+              </a:ext>
+            </a:extLst>
+          </p:cNvPr>
+          <p:cNvSpPr>
+            <a:spLocks noGrp="1"/>
+          </p:cNvSpPr>
+          <p:nvPr>
+            <p:ph type="sldNum" sz="quarter" idx="4"/>
+          </p:nvPr>
+        </p:nvSpPr>
+        <p:spPr/>
+        <p:txBody>
+          <a:bodyPr/>
+          <a:lstStyle/>
+          <a:p>
+            <a:fld id="{3E01A2B2-10AD-754B-9B4C-E5B6FED423D0}" type="slidenum">
+              <a:rPr lang="de-DE" smtClean="0"/>
+              <a:t>6</a:t>
+            </a:fld>
+            <a:endParaRPr lang="de-DE"/>
+          </a:p>
+        </p:txBody>
+      </p:sp>
+      <p:graphicFrame>
+        <p:nvGraphicFramePr>
+          <p:cNvPr id="7" name="Tabelle 6">
+            <a:extLst>
+              <a:ext uri="{FF2B5EF4-FFF2-40B4-BE49-F238E27FC236}">
+                <a16:creationId xmlns:a16="http://schemas.microsoft.com/office/drawing/2014/main" id="{6060231F-B091-9344-AEBF-F98EDC29F0F4}"/>
+              </a:ext>
+            </a:extLst>
+          </p:cNvPr>
+          <p:cNvGraphicFramePr>
+            <a:graphicFrameLocks noGrp="1"/>
+          </p:cNvGraphicFramePr>
+          <p:nvPr>
+            <p:extLst>
+              <p:ext uri="{D42A27DB-BD31-4B8C-83A1-F6EECF244321}">
+                <p14:modId xmlns:p14="http://schemas.microsoft.com/office/powerpoint/2010/main" val="3813510897"/>
+              </p:ext>
+            </p:extLst>
+          </p:nvPr>
+        </p:nvGraphicFramePr>
+        <p:xfrm>
+          <a:off x="451465" y="1730386"/>
+          <a:ext cx="7936960" cy="2785580"/>
+        </p:xfrm>
+        <a:graphic>
+          <a:graphicData uri="http://schemas.openxmlformats.org/drawingml/2006/table">
+            <a:tbl>
+              <a:tblPr firstRow="1" bandRow="1">
+                <a:tableStyleId>{5C22544A-7EE6-4342-B048-85BDC9FD1C3A}</a:tableStyleId>
+              </a:tblPr>
+              <a:tblGrid>
+                <a:gridCol w="1587392">
+                  <a:extLst>
+                    <a:ext uri="{9D8B030D-6E8A-4147-A177-3AD203B41FA5}">
+                      <a16:colId xmlns:a16="http://schemas.microsoft.com/office/drawing/2014/main" val="601531448"/>
+                    </a:ext>
+                  </a:extLst>
+                </a:gridCol>
+                <a:gridCol w="1587392">
+                  <a:extLst>
+                    <a:ext uri="{9D8B030D-6E8A-4147-A177-3AD203B41FA5}">
+                      <a16:colId xmlns:a16="http://schemas.microsoft.com/office/drawing/2014/main" val="3425038646"/>
+                    </a:ext>
+                  </a:extLst>
+                </a:gridCol>
+                <a:gridCol w="1587392">
+                  <a:extLst>
+                    <a:ext uri="{9D8B030D-6E8A-4147-A177-3AD203B41FA5}">
+                      <a16:colId xmlns:a16="http://schemas.microsoft.com/office/drawing/2014/main" val="317061427"/>
+                    </a:ext>
+                  </a:extLst>
+                </a:gridCol>
+                <a:gridCol w="1587392">
+                  <a:extLst>
+                    <a:ext uri="{9D8B030D-6E8A-4147-A177-3AD203B41FA5}">
+                      <a16:colId xmlns:a16="http://schemas.microsoft.com/office/drawing/2014/main" val="1508695298"/>
+                    </a:ext>
+                  </a:extLst>
+                </a:gridCol>
+                <a:gridCol w="1587392">
+                  <a:extLst>
+                    <a:ext uri="{9D8B030D-6E8A-4147-A177-3AD203B41FA5}">
+                      <a16:colId xmlns:a16="http://schemas.microsoft.com/office/drawing/2014/main" val="2966084005"/>
+                    </a:ext>
+                  </a:extLst>
+                </a:gridCol>
+              </a:tblGrid>
+              <a:tr h="696395">
+                <a:tc>
+                  <a:txBody>
+                    <a:bodyPr/>
+                    <a:lstStyle/>
+                    <a:p>
+                      <a:endParaRPr lang="de-DE" dirty="0"/>
+                    </a:p>
+                  </a:txBody>
+                  <a:tcPr/>
+                </a:tc>
+                <a:tc>
+                  <a:txBody>
+                    <a:bodyPr/>
+                    <a:lstStyle/>
+                    <a:p>
+                      <a:r>
+                        <a:rPr lang="de-DE" dirty="0"/>
+                        <a:t>KNN</a:t>
+                      </a:r>
+                    </a:p>
+                  </a:txBody>
+                  <a:tcPr/>
+                </a:tc>
+                <a:tc>
+                  <a:txBody>
+                    <a:bodyPr/>
+                    <a:lstStyle/>
+                    <a:p>
+                      <a:r>
+                        <a:rPr lang="de-DE" dirty="0" err="1"/>
+                        <a:t>Adaboost</a:t>
+                      </a:r>
+                      <a:endParaRPr lang="de-DE" dirty="0"/>
+                    </a:p>
+                  </a:txBody>
+                  <a:tcPr/>
+                </a:tc>
+                <a:tc>
+                  <a:txBody>
+                    <a:bodyPr/>
+                    <a:lstStyle/>
+                    <a:p>
+                      <a:r>
+                        <a:rPr lang="de-DE" dirty="0"/>
+                        <a:t>SVM</a:t>
+                      </a:r>
+                    </a:p>
+                  </a:txBody>
+                  <a:tcPr/>
+                </a:tc>
+                <a:tc>
+                  <a:txBody>
+                    <a:bodyPr/>
+                    <a:lstStyle/>
+                    <a:p>
+                      <a:r>
+                        <a:rPr lang="de-DE" dirty="0"/>
+                        <a:t>CNN</a:t>
+                      </a:r>
+                    </a:p>
+                  </a:txBody>
+                  <a:tcPr/>
+                </a:tc>
+                <a:extLst>
+                  <a:ext uri="{0D108BD9-81ED-4DB2-BD59-A6C34878D82A}">
+                    <a16:rowId xmlns:a16="http://schemas.microsoft.com/office/drawing/2014/main" val="2725344805"/>
+                  </a:ext>
+                </a:extLst>
+              </a:tr>
+              <a:tr h="696395">
+                <a:tc>
+                  <a:txBody>
+                    <a:bodyPr/>
+                    <a:lstStyle/>
+                    <a:p>
+                      <a:r>
+                        <a:rPr lang="de-DE" dirty="0"/>
+                        <a:t>7 </a:t>
+                      </a:r>
+                      <a:r>
+                        <a:rPr lang="de-DE" dirty="0" err="1"/>
+                        <a:t>Emotions</a:t>
+                      </a:r>
+                      <a:endParaRPr lang="de-DE" dirty="0"/>
+                    </a:p>
+                  </a:txBody>
+                  <a:tcPr/>
+                </a:tc>
+                <a:tc>
+                  <a:txBody>
+                    <a:bodyPr/>
+                    <a:lstStyle/>
+                    <a:p>
+                      <a:r>
+                        <a:rPr lang="de-DE" dirty="0"/>
+                        <a:t>???</a:t>
+                      </a:r>
+                    </a:p>
+                  </a:txBody>
+                  <a:tcPr/>
+                </a:tc>
+                <a:tc>
+                  <a:txBody>
+                    <a:bodyPr/>
+                    <a:lstStyle/>
+                    <a:p>
+                      <a:r>
+                        <a:rPr lang="de-DE" dirty="0"/>
+                        <a:t>36,4 %</a:t>
+                      </a:r>
+                    </a:p>
+                  </a:txBody>
+                  <a:tcPr/>
+                </a:tc>
+                <a:tc>
+                  <a:txBody>
+                    <a:bodyPr/>
+                    <a:lstStyle/>
+                    <a:p>
+                      <a:r>
+                        <a:rPr lang="de-DE" dirty="0"/>
+                        <a:t>42,7 %</a:t>
+                      </a:r>
+                    </a:p>
+                  </a:txBody>
+                  <a:tcPr/>
+                </a:tc>
+                <a:tc>
+                  <a:txBody>
+                    <a:bodyPr/>
+                    <a:lstStyle/>
+                    <a:p>
+                      <a:r>
+                        <a:rPr lang="de-DE" dirty="0">
+                          <a:solidFill>
+                            <a:srgbClr val="009C00"/>
+                          </a:solidFill>
+                        </a:rPr>
+                        <a:t>62 %</a:t>
+                      </a:r>
+                    </a:p>
+                  </a:txBody>
+                  <a:tcPr/>
+                </a:tc>
+                <a:extLst>
+                  <a:ext uri="{0D108BD9-81ED-4DB2-BD59-A6C34878D82A}">
+                    <a16:rowId xmlns:a16="http://schemas.microsoft.com/office/drawing/2014/main" val="2739222742"/>
+                  </a:ext>
+                </a:extLst>
+              </a:tr>
+              <a:tr h="696395">
+                <a:tc>
+                  <a:txBody>
+                    <a:bodyPr/>
+                    <a:lstStyle/>
+                    <a:p>
+                      <a:r>
+                        <a:rPr lang="de-DE" dirty="0"/>
+                        <a:t>Happy / </a:t>
+                      </a:r>
+                      <a:r>
+                        <a:rPr lang="de-DE" dirty="0" err="1"/>
+                        <a:t>Sad</a:t>
+                      </a:r>
+                      <a:r>
+                        <a:rPr lang="de-DE" dirty="0"/>
+                        <a:t> / Neutral</a:t>
+                      </a:r>
+                    </a:p>
+                  </a:txBody>
+                  <a:tcPr/>
+                </a:tc>
+                <a:tc>
+                  <a:txBody>
+                    <a:bodyPr/>
+                    <a:lstStyle/>
+                    <a:p>
+                      <a:r>
+                        <a:rPr lang="de-DE" dirty="0"/>
+                        <a:t>???</a:t>
+                      </a:r>
+                    </a:p>
+                  </a:txBody>
+                  <a:tcPr/>
+                </a:tc>
+                <a:tc>
+                  <a:txBody>
+                    <a:bodyPr/>
+                    <a:lstStyle/>
+                    <a:p>
+                      <a:r>
+                        <a:rPr lang="de-DE" dirty="0"/>
+                        <a:t>56,7 %</a:t>
+                      </a:r>
+                    </a:p>
+                  </a:txBody>
+                  <a:tcPr/>
+                </a:tc>
+                <a:tc>
+                  <a:txBody>
+                    <a:bodyPr/>
+                    <a:lstStyle/>
+                    <a:p>
+                      <a:r>
+                        <a:rPr lang="de-DE" dirty="0"/>
+                        <a:t>56,7 %</a:t>
+                      </a:r>
+                    </a:p>
+                  </a:txBody>
+                  <a:tcPr/>
+                </a:tc>
+                <a:tc>
+                  <a:txBody>
+                    <a:bodyPr/>
+                    <a:lstStyle/>
+                    <a:p>
+                      <a:r>
+                        <a:rPr lang="de-DE" dirty="0">
+                          <a:solidFill>
+                            <a:srgbClr val="009C00"/>
+                          </a:solidFill>
+                        </a:rPr>
+                        <a:t>78 %</a:t>
+                      </a:r>
+                    </a:p>
+                  </a:txBody>
+                  <a:tcPr/>
+                </a:tc>
+                <a:extLst>
+                  <a:ext uri="{0D108BD9-81ED-4DB2-BD59-A6C34878D82A}">
+                    <a16:rowId xmlns:a16="http://schemas.microsoft.com/office/drawing/2014/main" val="1979897573"/>
+                  </a:ext>
+                </a:extLst>
+              </a:tr>
+              <a:tr h="696395">
+                <a:tc>
+                  <a:txBody>
+                    <a:bodyPr/>
+                    <a:lstStyle/>
+                    <a:p>
+                      <a:r>
+                        <a:rPr lang="de-DE" dirty="0"/>
+                        <a:t>Happy / Neutral</a:t>
+                      </a:r>
+                    </a:p>
+                  </a:txBody>
+                  <a:tcPr/>
+                </a:tc>
+                <a:tc>
+                  <a:txBody>
+                    <a:bodyPr/>
+                    <a:lstStyle/>
+                    <a:p>
+                      <a:r>
+                        <a:rPr lang="de-DE" dirty="0"/>
+                        <a:t>???</a:t>
+                      </a:r>
+                    </a:p>
+                  </a:txBody>
+                  <a:tcPr/>
+                </a:tc>
+                <a:tc>
+                  <a:txBody>
+                    <a:bodyPr/>
+                    <a:lstStyle/>
+                    <a:p>
+                      <a:r>
+                        <a:rPr lang="de-DE" dirty="0"/>
+                        <a:t>73,3 %</a:t>
+                      </a:r>
+                    </a:p>
+                  </a:txBody>
+                  <a:tcPr/>
+                </a:tc>
+                <a:tc>
+                  <a:txBody>
+                    <a:bodyPr/>
+                    <a:lstStyle/>
+                    <a:p>
+                      <a:r>
+                        <a:rPr lang="de-DE" dirty="0"/>
+                        <a:t>73 %</a:t>
+                      </a:r>
+                    </a:p>
+                  </a:txBody>
+                  <a:tcPr/>
+                </a:tc>
+                <a:tc>
+                  <a:txBody>
+                    <a:bodyPr/>
+                    <a:lstStyle/>
+                    <a:p>
+                      <a:r>
+                        <a:rPr lang="de-DE" dirty="0">
+                          <a:solidFill>
+                            <a:srgbClr val="009C00"/>
+                          </a:solidFill>
+                        </a:rPr>
+                        <a:t>91 %</a:t>
+                      </a:r>
+                    </a:p>
+                  </a:txBody>
+                  <a:tcPr/>
+                </a:tc>
+                <a:extLst>
+                  <a:ext uri="{0D108BD9-81ED-4DB2-BD59-A6C34878D82A}">
+                    <a16:rowId xmlns:a16="http://schemas.microsoft.com/office/drawing/2014/main" val="1744340242"/>
+                  </a:ext>
+                </a:extLst>
+              </a:tr>
+            </a:tbl>
+          </a:graphicData>
+        </a:graphic>
+      </p:graphicFrame>
+    </p:spTree>
+    <p:extLst>
+      <p:ext uri="{BB962C8B-B14F-4D97-AF65-F5344CB8AC3E}">
+        <p14:creationId xmlns:p14="http://schemas.microsoft.com/office/powerpoint/2010/main" val="4091421957"/>
+      </p:ext>
+    </p:extLst>
+  </p:cSld>
+  <p:clrMapOvr>
+    <a:masterClrMapping/>
+  </p:clrMapOvr>
+</p:sld>
+</file>
+
+<file path=ppt/slides/slide7.xml><?xml version="1.0" encoding="utf-8"?>
 <p:sld xmlns:a="http://schemas.openxmlformats.org/drawingml/2006/main" xmlns:r="http://schemas.openxmlformats.org/officeDocument/2006/relationships" xmlns:p="http://schemas.openxmlformats.org/presentationml/2006/main">
   <p:cSld>
     <p:spTree>

</xml_diff>

<commit_message>
First sketch of responsibilities slide
</commit_message>
<xml_diff>
--- a/Documentation/SVM Folien.pptx
+++ b/Documentation/SVM Folien.pptx
@@ -5,10 +5,10 @@
     <p:sldMasterId id="2147483648" r:id="rId1"/>
   </p:sldMasterIdLst>
   <p:notesMasterIdLst>
-    <p:notesMasterId r:id="rId9"/>
+    <p:notesMasterId r:id="rId10"/>
   </p:notesMasterIdLst>
   <p:handoutMasterIdLst>
-    <p:handoutMasterId r:id="rId10"/>
+    <p:handoutMasterId r:id="rId11"/>
   </p:handoutMasterIdLst>
   <p:sldIdLst>
     <p:sldId id="302" r:id="rId2"/>
@@ -17,7 +17,8 @@
     <p:sldId id="301" r:id="rId5"/>
     <p:sldId id="303" r:id="rId6"/>
     <p:sldId id="305" r:id="rId7"/>
-    <p:sldId id="287" r:id="rId8"/>
+    <p:sldId id="306" r:id="rId8"/>
+    <p:sldId id="287" r:id="rId9"/>
   </p:sldIdLst>
   <p:sldSz cx="9144000" cy="5143500" type="screen16x9"/>
   <p:notesSz cx="6858000" cy="9144000"/>
@@ -232,7 +233,7 @@
           <a:p>
             <a:fld id="{2DEC1590-0E15-4557-9C65-D8AD6B18B0C9}" type="datetimeFigureOut">
               <a:rPr lang="de-DE" smtClean="0"/>
-              <a:t>11.07.20</a:t>
+              <a:t>14.07.20</a:t>
             </a:fld>
             <a:endParaRPr lang="de-DE"/>
           </a:p>
@@ -409,7 +410,7 @@
           <a:p>
             <a:fld id="{04B5924E-4B7F-4B37-BD36-3DA72D6B2A43}" type="datetimeFigureOut">
               <a:rPr lang="de-DE" smtClean="0"/>
-              <a:t>11.07.20</a:t>
+              <a:t>14.07.20</a:t>
             </a:fld>
             <a:endParaRPr lang="de-DE"/>
           </a:p>
@@ -959,7 +960,7 @@
           <a:p>
             <a:fld id="{09D069C5-CC22-4E88-BB35-FA27CD7EA121}" type="datetime1">
               <a:rPr lang="de-DE" smtClean="0"/>
-              <a:t>11.07.20</a:t>
+              <a:t>14.07.20</a:t>
             </a:fld>
             <a:endParaRPr lang="de-DE" dirty="0"/>
           </a:p>
@@ -1337,7 +1338,7 @@
           <a:p>
             <a:fld id="{09D069C5-CC22-4E88-BB35-FA27CD7EA121}" type="datetime1">
               <a:rPr lang="de-DE" smtClean="0"/>
-              <a:t>11.07.20</a:t>
+              <a:t>14.07.20</a:t>
             </a:fld>
             <a:endParaRPr lang="de-DE" dirty="0"/>
           </a:p>
@@ -1693,7 +1694,7 @@
           <a:p>
             <a:fld id="{09D069C5-CC22-4E88-BB35-FA27CD7EA121}" type="datetime1">
               <a:rPr lang="de-DE" smtClean="0"/>
-              <a:t>11.07.20</a:t>
+              <a:t>14.07.20</a:t>
             </a:fld>
             <a:endParaRPr lang="de-DE" dirty="0"/>
           </a:p>
@@ -2048,7 +2049,7 @@
           <a:p>
             <a:fld id="{09D069C5-CC22-4E88-BB35-FA27CD7EA121}" type="datetime1">
               <a:rPr lang="de-DE" smtClean="0"/>
-              <a:t>11.07.20</a:t>
+              <a:t>14.07.20</a:t>
             </a:fld>
             <a:endParaRPr lang="de-DE" dirty="0"/>
           </a:p>
@@ -2312,7 +2313,7 @@
           <a:p>
             <a:fld id="{09D069C5-CC22-4E88-BB35-FA27CD7EA121}" type="datetime1">
               <a:rPr lang="de-DE" smtClean="0"/>
-              <a:t>11.07.20</a:t>
+              <a:t>14.07.20</a:t>
             </a:fld>
             <a:endParaRPr lang="de-DE" dirty="0"/>
           </a:p>
@@ -2519,7 +2520,7 @@
           <a:p>
             <a:fld id="{09D069C5-CC22-4E88-BB35-FA27CD7EA121}" type="datetime1">
               <a:rPr lang="de-DE" smtClean="0"/>
-              <a:t>11.07.20</a:t>
+              <a:t>14.07.20</a:t>
             </a:fld>
             <a:endParaRPr lang="de-DE" dirty="0"/>
           </a:p>
@@ -2799,7 +2800,7 @@
           <a:p>
             <a:fld id="{09D069C5-CC22-4E88-BB35-FA27CD7EA121}" type="datetime1">
               <a:rPr lang="de-DE" smtClean="0"/>
-              <a:t>11.07.20</a:t>
+              <a:t>14.07.20</a:t>
             </a:fld>
             <a:endParaRPr lang="de-DE" dirty="0"/>
           </a:p>
@@ -4158,7 +4159,7 @@
           <a:p>
             <a:fld id="{09D069C5-CC22-4E88-BB35-FA27CD7EA121}" type="datetime1">
               <a:rPr lang="de-DE" smtClean="0"/>
-              <a:t>11.07.20</a:t>
+              <a:t>14.07.20</a:t>
             </a:fld>
             <a:endParaRPr lang="de-DE" dirty="0"/>
           </a:p>
@@ -4856,7 +4857,7 @@
           <a:p>
             <a:fld id="{09D069C5-CC22-4E88-BB35-FA27CD7EA121}" type="datetime1">
               <a:rPr lang="de-DE" smtClean="0"/>
-              <a:t>11.07.20</a:t>
+              <a:t>14.07.20</a:t>
             </a:fld>
             <a:endParaRPr lang="de-DE" dirty="0"/>
           </a:p>
@@ -5814,7 +5815,7 @@
           <a:p>
             <a:fld id="{09D069C5-CC22-4E88-BB35-FA27CD7EA121}" type="datetime1">
               <a:rPr lang="de-DE" smtClean="0"/>
-              <a:t>11.07.20</a:t>
+              <a:t>14.07.20</a:t>
             </a:fld>
             <a:endParaRPr lang="de-DE" dirty="0"/>
           </a:p>
@@ -6399,7 +6400,7 @@
           <a:p>
             <a:fld id="{09D069C5-CC22-4E88-BB35-FA27CD7EA121}" type="datetime1">
               <a:rPr lang="de-DE" smtClean="0"/>
-              <a:t>11.07.20</a:t>
+              <a:t>14.07.20</a:t>
             </a:fld>
             <a:endParaRPr lang="de-DE" dirty="0"/>
           </a:p>
@@ -6753,7 +6754,7 @@
           <a:p>
             <a:fld id="{09D069C5-CC22-4E88-BB35-FA27CD7EA121}" type="datetime1">
               <a:rPr lang="de-DE" smtClean="0"/>
-              <a:t>11.07.20</a:t>
+              <a:t>14.07.20</a:t>
             </a:fld>
             <a:endParaRPr lang="de-DE" dirty="0"/>
           </a:p>
@@ -6929,7 +6930,7 @@
           <a:p>
             <a:fld id="{09D069C5-CC22-4E88-BB35-FA27CD7EA121}" type="datetime1">
               <a:rPr lang="de-DE" smtClean="0"/>
-              <a:t>11.07.20</a:t>
+              <a:t>14.07.20</a:t>
             </a:fld>
             <a:endParaRPr lang="de-DE" dirty="0"/>
           </a:p>
@@ -7389,6 +7390,597 @@
 </file>
 
 <file path=ppt/slides/slide7.xml><?xml version="1.0" encoding="utf-8"?>
+<p:sld xmlns:a="http://schemas.openxmlformats.org/drawingml/2006/main" xmlns:r="http://schemas.openxmlformats.org/officeDocument/2006/relationships" xmlns:p="http://schemas.openxmlformats.org/presentationml/2006/main">
+  <p:cSld>
+    <p:spTree>
+      <p:nvGrpSpPr>
+        <p:cNvPr id="1" name=""/>
+        <p:cNvGrpSpPr/>
+        <p:nvPr/>
+      </p:nvGrpSpPr>
+      <p:grpSpPr>
+        <a:xfrm>
+          <a:off x="0" y="0"/>
+          <a:ext cx="0" cy="0"/>
+          <a:chOff x="0" y="0"/>
+          <a:chExt cx="0" cy="0"/>
+        </a:xfrm>
+      </p:grpSpPr>
+      <p:sp>
+        <p:nvSpPr>
+          <p:cNvPr id="2" name="Textplatzhalter 1">
+            <a:extLst>
+              <a:ext uri="{FF2B5EF4-FFF2-40B4-BE49-F238E27FC236}">
+                <a16:creationId xmlns:a16="http://schemas.microsoft.com/office/drawing/2014/main" id="{32306E02-8FA6-6C4A-84EE-1AB0B2A3AD67}"/>
+              </a:ext>
+            </a:extLst>
+          </p:cNvPr>
+          <p:cNvSpPr>
+            <a:spLocks noGrp="1"/>
+          </p:cNvSpPr>
+          <p:nvPr>
+            <p:ph type="body" sz="quarter" idx="13"/>
+          </p:nvPr>
+        </p:nvSpPr>
+        <p:spPr>
+          <a:xfrm>
+            <a:off x="214769" y="339676"/>
+            <a:ext cx="8533695" cy="503882"/>
+          </a:xfrm>
+        </p:spPr>
+        <p:txBody>
+          <a:bodyPr/>
+          <a:lstStyle/>
+          <a:p>
+            <a:pPr algn="ctr"/>
+            <a:r>
+              <a:rPr lang="de-DE" dirty="0" err="1"/>
+              <a:t>Responsibilities</a:t>
+            </a:r>
+            <a:endParaRPr lang="de-DE" dirty="0"/>
+          </a:p>
+        </p:txBody>
+      </p:sp>
+      <p:sp>
+        <p:nvSpPr>
+          <p:cNvPr id="4" name="Datumsplatzhalter 3">
+            <a:extLst>
+              <a:ext uri="{FF2B5EF4-FFF2-40B4-BE49-F238E27FC236}">
+                <a16:creationId xmlns:a16="http://schemas.microsoft.com/office/drawing/2014/main" id="{3F9DD9F1-DB15-C949-89D3-ABCF878521AA}"/>
+              </a:ext>
+            </a:extLst>
+          </p:cNvPr>
+          <p:cNvSpPr>
+            <a:spLocks noGrp="1"/>
+          </p:cNvSpPr>
+          <p:nvPr>
+            <p:ph type="dt" sz="half" idx="2"/>
+          </p:nvPr>
+        </p:nvSpPr>
+        <p:spPr/>
+        <p:txBody>
+          <a:bodyPr/>
+          <a:lstStyle/>
+          <a:p>
+            <a:fld id="{09D069C5-CC22-4E88-BB35-FA27CD7EA121}" type="datetime1">
+              <a:rPr lang="de-DE" smtClean="0"/>
+              <a:t>14.07.20</a:t>
+            </a:fld>
+            <a:endParaRPr lang="de-DE" dirty="0"/>
+          </a:p>
+        </p:txBody>
+      </p:sp>
+      <p:sp>
+        <p:nvSpPr>
+          <p:cNvPr id="5" name="Fußzeilenplatzhalter 4">
+            <a:extLst>
+              <a:ext uri="{FF2B5EF4-FFF2-40B4-BE49-F238E27FC236}">
+                <a16:creationId xmlns:a16="http://schemas.microsoft.com/office/drawing/2014/main" id="{0630BE2E-9244-5C4B-8930-2AEF36BC1DB5}"/>
+              </a:ext>
+            </a:extLst>
+          </p:cNvPr>
+          <p:cNvSpPr>
+            <a:spLocks noGrp="1"/>
+          </p:cNvSpPr>
+          <p:nvPr>
+            <p:ph type="ftr" sz="quarter" idx="3"/>
+          </p:nvPr>
+        </p:nvSpPr>
+        <p:spPr/>
+        <p:txBody>
+          <a:bodyPr/>
+          <a:lstStyle/>
+          <a:p>
+            <a:r>
+              <a:rPr lang="de-DE"/>
+              <a:t>Group 5 - Facial emotion recognition</a:t>
+            </a:r>
+            <a:endParaRPr lang="de-DE" dirty="0"/>
+          </a:p>
+        </p:txBody>
+      </p:sp>
+      <p:sp>
+        <p:nvSpPr>
+          <p:cNvPr id="6" name="Foliennummernplatzhalter 5">
+            <a:extLst>
+              <a:ext uri="{FF2B5EF4-FFF2-40B4-BE49-F238E27FC236}">
+                <a16:creationId xmlns:a16="http://schemas.microsoft.com/office/drawing/2014/main" id="{F8387CDA-0778-4E45-B4DE-E8733ACA73E9}"/>
+              </a:ext>
+            </a:extLst>
+          </p:cNvPr>
+          <p:cNvSpPr>
+            <a:spLocks noGrp="1"/>
+          </p:cNvSpPr>
+          <p:nvPr>
+            <p:ph type="sldNum" sz="quarter" idx="4"/>
+          </p:nvPr>
+        </p:nvSpPr>
+        <p:spPr/>
+        <p:txBody>
+          <a:bodyPr/>
+          <a:lstStyle/>
+          <a:p>
+            <a:fld id="{3E01A2B2-10AD-754B-9B4C-E5B6FED423D0}" type="slidenum">
+              <a:rPr lang="de-DE" smtClean="0"/>
+              <a:t>7</a:t>
+            </a:fld>
+            <a:endParaRPr lang="de-DE"/>
+          </a:p>
+        </p:txBody>
+      </p:sp>
+      <p:graphicFrame>
+        <p:nvGraphicFramePr>
+          <p:cNvPr id="7" name="Tabelle 6">
+            <a:extLst>
+              <a:ext uri="{FF2B5EF4-FFF2-40B4-BE49-F238E27FC236}">
+                <a16:creationId xmlns:a16="http://schemas.microsoft.com/office/drawing/2014/main" id="{3845AE41-C089-B042-8297-7AE1B076943B}"/>
+              </a:ext>
+            </a:extLst>
+          </p:cNvPr>
+          <p:cNvGraphicFramePr>
+            <a:graphicFrameLocks noGrp="1"/>
+          </p:cNvGraphicFramePr>
+          <p:nvPr>
+            <p:extLst>
+              <p:ext uri="{D42A27DB-BD31-4B8C-83A1-F6EECF244321}">
+                <p14:modId xmlns:p14="http://schemas.microsoft.com/office/powerpoint/2010/main" val="908279414"/>
+              </p:ext>
+            </p:extLst>
+          </p:nvPr>
+        </p:nvGraphicFramePr>
+        <p:xfrm>
+          <a:off x="323527" y="1275606"/>
+          <a:ext cx="8533696" cy="3240360"/>
+        </p:xfrm>
+        <a:graphic>
+          <a:graphicData uri="http://schemas.openxmlformats.org/drawingml/2006/table">
+            <a:tbl>
+              <a:tblPr firstRow="1" bandRow="1">
+                <a:tableStyleId>{5C22544A-7EE6-4342-B048-85BDC9FD1C3A}</a:tableStyleId>
+              </a:tblPr>
+              <a:tblGrid>
+                <a:gridCol w="4266848">
+                  <a:extLst>
+                    <a:ext uri="{9D8B030D-6E8A-4147-A177-3AD203B41FA5}">
+                      <a16:colId xmlns:a16="http://schemas.microsoft.com/office/drawing/2014/main" val="340597497"/>
+                    </a:ext>
+                  </a:extLst>
+                </a:gridCol>
+                <a:gridCol w="4266848">
+                  <a:extLst>
+                    <a:ext uri="{9D8B030D-6E8A-4147-A177-3AD203B41FA5}">
+                      <a16:colId xmlns:a16="http://schemas.microsoft.com/office/drawing/2014/main" val="3394232380"/>
+                    </a:ext>
+                  </a:extLst>
+                </a:gridCol>
+              </a:tblGrid>
+              <a:tr h="540060">
+                <a:tc>
+                  <a:txBody>
+                    <a:bodyPr/>
+                    <a:lstStyle/>
+                    <a:p>
+                      <a:r>
+                        <a:rPr lang="de-DE" dirty="0"/>
+                        <a:t>Name</a:t>
+                      </a:r>
+                    </a:p>
+                  </a:txBody>
+                  <a:tcPr/>
+                </a:tc>
+                <a:tc>
+                  <a:txBody>
+                    <a:bodyPr/>
+                    <a:lstStyle/>
+                    <a:p>
+                      <a:r>
+                        <a:rPr lang="de-DE" dirty="0"/>
+                        <a:t>Tasks / </a:t>
+                      </a:r>
+                      <a:r>
+                        <a:rPr lang="de-DE" dirty="0" err="1"/>
+                        <a:t>Roles</a:t>
+                      </a:r>
+                      <a:endParaRPr lang="de-DE" dirty="0"/>
+                    </a:p>
+                  </a:txBody>
+                  <a:tcPr/>
+                </a:tc>
+                <a:extLst>
+                  <a:ext uri="{0D108BD9-81ED-4DB2-BD59-A6C34878D82A}">
+                    <a16:rowId xmlns:a16="http://schemas.microsoft.com/office/drawing/2014/main" val="2197464425"/>
+                  </a:ext>
+                </a:extLst>
+              </a:tr>
+              <a:tr h="540060">
+                <a:tc>
+                  <a:txBody>
+                    <a:bodyPr/>
+                    <a:lstStyle/>
+                    <a:p>
+                      <a:r>
+                        <a:rPr lang="de-DE" dirty="0"/>
+                        <a:t>Max</a:t>
+                      </a:r>
+                    </a:p>
+                  </a:txBody>
+                  <a:tcPr/>
+                </a:tc>
+                <a:tc>
+                  <a:txBody>
+                    <a:bodyPr/>
+                    <a:lstStyle/>
+                    <a:p>
+                      <a:r>
+                        <a:rPr lang="de-DE" sz="1400" dirty="0"/>
+                        <a:t>Project Manager, </a:t>
+                      </a:r>
+                      <a:r>
+                        <a:rPr lang="de-DE" sz="1400" dirty="0" err="1"/>
+                        <a:t>Git</a:t>
+                      </a:r>
+                      <a:r>
+                        <a:rPr lang="de-DE" sz="1400" dirty="0"/>
+                        <a:t> </a:t>
+                      </a:r>
+                      <a:r>
+                        <a:rPr lang="de-DE" sz="1400" dirty="0" err="1"/>
+                        <a:t>introduction</a:t>
+                      </a:r>
+                      <a:r>
+                        <a:rPr lang="de-DE" sz="1400" dirty="0"/>
+                        <a:t>, SVM </a:t>
+                      </a:r>
+                      <a:r>
+                        <a:rPr lang="de-DE" sz="1400" dirty="0" err="1"/>
+                        <a:t>implementation</a:t>
+                      </a:r>
+                      <a:r>
+                        <a:rPr lang="de-DE" sz="1400" dirty="0"/>
+                        <a:t>, SVM </a:t>
+                      </a:r>
+                      <a:r>
+                        <a:rPr lang="de-DE" sz="1400" dirty="0" err="1"/>
+                        <a:t>documentation</a:t>
+                      </a:r>
+                      <a:r>
+                        <a:rPr lang="de-DE" sz="1400" dirty="0"/>
+                        <a:t>, </a:t>
+                      </a:r>
+                      <a:r>
+                        <a:rPr lang="de-DE" sz="1400" dirty="0" err="1"/>
+                        <a:t>dataset</a:t>
+                      </a:r>
+                      <a:endParaRPr lang="de-DE" sz="1400" dirty="0"/>
+                    </a:p>
+                  </a:txBody>
+                  <a:tcPr/>
+                </a:tc>
+                <a:extLst>
+                  <a:ext uri="{0D108BD9-81ED-4DB2-BD59-A6C34878D82A}">
+                    <a16:rowId xmlns:a16="http://schemas.microsoft.com/office/drawing/2014/main" val="1667389330"/>
+                  </a:ext>
+                </a:extLst>
+              </a:tr>
+              <a:tr h="540060">
+                <a:tc>
+                  <a:txBody>
+                    <a:bodyPr/>
+                    <a:lstStyle/>
+                    <a:p>
+                      <a:r>
+                        <a:rPr lang="de-DE" dirty="0" err="1"/>
+                        <a:t>Gulia</a:t>
+                      </a:r>
+                      <a:endParaRPr lang="de-DE" dirty="0"/>
+                    </a:p>
+                  </a:txBody>
+                  <a:tcPr/>
+                </a:tc>
+                <a:tc>
+                  <a:txBody>
+                    <a:bodyPr/>
+                    <a:lstStyle/>
+                    <a:p>
+                      <a:r>
+                        <a:rPr lang="de-DE" sz="1400" dirty="0" err="1"/>
+                        <a:t>Documentation</a:t>
+                      </a:r>
+                      <a:r>
+                        <a:rPr lang="de-DE" sz="1400" dirty="0"/>
+                        <a:t> </a:t>
+                      </a:r>
+                      <a:r>
+                        <a:rPr lang="de-DE" sz="1400" dirty="0" err="1"/>
+                        <a:t>of</a:t>
+                      </a:r>
+                      <a:r>
+                        <a:rPr lang="de-DE" sz="1400" dirty="0"/>
+                        <a:t> </a:t>
+                      </a:r>
+                      <a:r>
+                        <a:rPr lang="de-DE" sz="1400" dirty="0" err="1"/>
+                        <a:t>goals</a:t>
+                      </a:r>
+                      <a:r>
+                        <a:rPr lang="de-DE" sz="1400" dirty="0"/>
+                        <a:t> </a:t>
+                      </a:r>
+                      <a:r>
+                        <a:rPr lang="de-DE" sz="1400" dirty="0" err="1"/>
+                        <a:t>and</a:t>
+                      </a:r>
+                      <a:r>
+                        <a:rPr lang="de-DE" sz="1400" dirty="0"/>
+                        <a:t> </a:t>
+                      </a:r>
+                      <a:r>
+                        <a:rPr lang="de-DE" sz="1400" dirty="0" err="1"/>
+                        <a:t>progress</a:t>
+                      </a:r>
+                      <a:r>
+                        <a:rPr lang="de-DE" sz="1400" dirty="0"/>
+                        <a:t>, </a:t>
+                      </a:r>
+                      <a:r>
+                        <a:rPr lang="de-DE" sz="1400" dirty="0" err="1"/>
+                        <a:t>general</a:t>
+                      </a:r>
+                      <a:r>
+                        <a:rPr lang="de-DE" sz="1400" dirty="0"/>
+                        <a:t> </a:t>
+                      </a:r>
+                      <a:r>
+                        <a:rPr lang="de-DE" sz="1400" dirty="0" err="1"/>
+                        <a:t>machine</a:t>
+                      </a:r>
+                      <a:r>
+                        <a:rPr lang="de-DE" sz="1400" dirty="0"/>
+                        <a:t> </a:t>
+                      </a:r>
+                      <a:r>
+                        <a:rPr lang="de-DE" sz="1400" dirty="0" err="1"/>
+                        <a:t>learning</a:t>
+                      </a:r>
+                      <a:r>
+                        <a:rPr lang="de-DE" sz="1400" dirty="0"/>
+                        <a:t> </a:t>
+                      </a:r>
+                      <a:r>
+                        <a:rPr lang="de-DE" sz="1400" dirty="0" err="1"/>
+                        <a:t>documentation</a:t>
+                      </a:r>
+                      <a:r>
+                        <a:rPr lang="de-DE" sz="1400" dirty="0"/>
+                        <a:t>, </a:t>
+                      </a:r>
+                      <a:r>
+                        <a:rPr lang="de-DE" sz="1400" dirty="0" err="1"/>
+                        <a:t>dataset</a:t>
+                      </a:r>
+                      <a:endParaRPr lang="de-DE" sz="1400" dirty="0"/>
+                    </a:p>
+                  </a:txBody>
+                  <a:tcPr/>
+                </a:tc>
+                <a:extLst>
+                  <a:ext uri="{0D108BD9-81ED-4DB2-BD59-A6C34878D82A}">
+                    <a16:rowId xmlns:a16="http://schemas.microsoft.com/office/drawing/2014/main" val="3133216954"/>
+                  </a:ext>
+                </a:extLst>
+              </a:tr>
+              <a:tr h="540060">
+                <a:tc>
+                  <a:txBody>
+                    <a:bodyPr/>
+                    <a:lstStyle/>
+                    <a:p>
+                      <a:r>
+                        <a:rPr lang="de-DE" dirty="0"/>
+                        <a:t>Jonas</a:t>
+                      </a:r>
+                    </a:p>
+                  </a:txBody>
+                  <a:tcPr/>
+                </a:tc>
+                <a:tc>
+                  <a:txBody>
+                    <a:bodyPr/>
+                    <a:lstStyle/>
+                    <a:p>
+                      <a:r>
+                        <a:rPr lang="de-DE" sz="1400" dirty="0"/>
+                        <a:t>NN </a:t>
+                      </a:r>
+                      <a:r>
+                        <a:rPr lang="de-DE" sz="1400" dirty="0" err="1"/>
+                        <a:t>implementation</a:t>
+                      </a:r>
+                      <a:r>
+                        <a:rPr lang="de-DE" sz="1400" dirty="0"/>
+                        <a:t>, NN </a:t>
+                      </a:r>
+                      <a:r>
+                        <a:rPr lang="de-DE" sz="1400" dirty="0" err="1"/>
+                        <a:t>documentation</a:t>
+                      </a:r>
+                      <a:r>
+                        <a:rPr lang="de-DE" sz="1400" dirty="0"/>
+                        <a:t>, GUI, </a:t>
+                      </a:r>
+                      <a:r>
+                        <a:rPr lang="de-DE" sz="1400" dirty="0" err="1"/>
+                        <a:t>dataset</a:t>
+                      </a:r>
+                      <a:endParaRPr lang="de-DE" sz="1400" dirty="0"/>
+                    </a:p>
+                  </a:txBody>
+                  <a:tcPr/>
+                </a:tc>
+                <a:extLst>
+                  <a:ext uri="{0D108BD9-81ED-4DB2-BD59-A6C34878D82A}">
+                    <a16:rowId xmlns:a16="http://schemas.microsoft.com/office/drawing/2014/main" val="2413658164"/>
+                  </a:ext>
+                </a:extLst>
+              </a:tr>
+              <a:tr h="540060">
+                <a:tc>
+                  <a:txBody>
+                    <a:bodyPr/>
+                    <a:lstStyle/>
+                    <a:p>
+                      <a:r>
+                        <a:rPr lang="de-DE" dirty="0"/>
+                        <a:t>Timo</a:t>
+                      </a:r>
+                    </a:p>
+                  </a:txBody>
+                  <a:tcPr/>
+                </a:tc>
+                <a:tc>
+                  <a:txBody>
+                    <a:bodyPr/>
+                    <a:lstStyle/>
+                    <a:p>
+                      <a:r>
+                        <a:rPr lang="de-DE" sz="1400" dirty="0" err="1"/>
+                        <a:t>Decision</a:t>
+                      </a:r>
+                      <a:r>
+                        <a:rPr lang="de-DE" sz="1400" dirty="0"/>
+                        <a:t> </a:t>
+                      </a:r>
+                      <a:r>
+                        <a:rPr lang="de-DE" sz="1400" dirty="0" err="1"/>
+                        <a:t>Trees</a:t>
+                      </a:r>
+                      <a:r>
+                        <a:rPr lang="de-DE" sz="1400" dirty="0"/>
+                        <a:t>, </a:t>
+                      </a:r>
+                      <a:r>
+                        <a:rPr lang="de-DE" sz="1400" dirty="0" err="1"/>
+                        <a:t>adaboost</a:t>
+                      </a:r>
+                      <a:r>
+                        <a:rPr lang="de-DE" sz="1400" dirty="0"/>
+                        <a:t> </a:t>
+                      </a:r>
+                      <a:r>
+                        <a:rPr lang="de-DE" sz="1400" dirty="0" err="1"/>
+                        <a:t>implementation</a:t>
+                      </a:r>
+                      <a:r>
+                        <a:rPr lang="de-DE" sz="1400"/>
+                        <a:t>, </a:t>
+                      </a:r>
+                      <a:r>
+                        <a:rPr lang="de-DE" sz="1400" dirty="0" err="1"/>
+                        <a:t>dataset</a:t>
+                      </a:r>
+                      <a:endParaRPr lang="de-DE" sz="1400" dirty="0"/>
+                    </a:p>
+                  </a:txBody>
+                  <a:tcPr/>
+                </a:tc>
+                <a:extLst>
+                  <a:ext uri="{0D108BD9-81ED-4DB2-BD59-A6C34878D82A}">
+                    <a16:rowId xmlns:a16="http://schemas.microsoft.com/office/drawing/2014/main" val="4199958858"/>
+                  </a:ext>
+                </a:extLst>
+              </a:tr>
+              <a:tr h="540060">
+                <a:tc>
+                  <a:txBody>
+                    <a:bodyPr/>
+                    <a:lstStyle/>
+                    <a:p>
+                      <a:r>
+                        <a:rPr lang="de-DE" dirty="0"/>
+                        <a:t>John</a:t>
+                      </a:r>
+                    </a:p>
+                  </a:txBody>
+                  <a:tcPr/>
+                </a:tc>
+                <a:tc>
+                  <a:txBody>
+                    <a:bodyPr/>
+                    <a:lstStyle/>
+                    <a:p>
+                      <a:r>
+                        <a:rPr lang="de-DE" sz="1400" dirty="0"/>
+                        <a:t>KNN </a:t>
+                      </a:r>
+                      <a:r>
+                        <a:rPr lang="de-DE" sz="1400" dirty="0" err="1"/>
+                        <a:t>documentation</a:t>
+                      </a:r>
+                      <a:r>
+                        <a:rPr lang="de-DE" sz="1400" dirty="0"/>
+                        <a:t>, KNN </a:t>
+                      </a:r>
+                      <a:r>
+                        <a:rPr lang="de-DE" sz="1400" dirty="0" err="1"/>
+                        <a:t>implementation</a:t>
+                      </a:r>
+                      <a:r>
+                        <a:rPr lang="de-DE" sz="1400" dirty="0"/>
+                        <a:t>, </a:t>
+                      </a:r>
+                      <a:r>
+                        <a:rPr lang="de-DE" sz="1400" dirty="0" err="1"/>
+                        <a:t>dataset</a:t>
+                      </a:r>
+                      <a:endParaRPr lang="de-DE" sz="1400" dirty="0"/>
+                    </a:p>
+                  </a:txBody>
+                  <a:tcPr/>
+                </a:tc>
+                <a:extLst>
+                  <a:ext uri="{0D108BD9-81ED-4DB2-BD59-A6C34878D82A}">
+                    <a16:rowId xmlns:a16="http://schemas.microsoft.com/office/drawing/2014/main" val="3609407916"/>
+                  </a:ext>
+                </a:extLst>
+              </a:tr>
+            </a:tbl>
+          </a:graphicData>
+        </a:graphic>
+      </p:graphicFrame>
+    </p:spTree>
+    <p:extLst>
+      <p:ext uri="{BB962C8B-B14F-4D97-AF65-F5344CB8AC3E}">
+        <p14:creationId xmlns:p14="http://schemas.microsoft.com/office/powerpoint/2010/main" val="3834391726"/>
+      </p:ext>
+    </p:extLst>
+  </p:cSld>
+  <p:clrMapOvr>
+    <a:masterClrMapping/>
+  </p:clrMapOvr>
+</p:sld>
+</file>
+
+<file path=ppt/slides/slide8.xml><?xml version="1.0" encoding="utf-8"?>
 <p:sld xmlns:a="http://schemas.openxmlformats.org/drawingml/2006/main" xmlns:r="http://schemas.openxmlformats.org/officeDocument/2006/relationships" xmlns:p="http://schemas.openxmlformats.org/presentationml/2006/main">
   <p:cSld>
     <p:spTree>

</xml_diff>